<commit_message>
some slide work...adding second demo slide and cleaning up formatting
</commit_message>
<xml_diff>
--- a/mahout.pptx
+++ b/mahout.pptx
@@ -5,7 +5,7 @@
     <p:sldMasterId id="2147483660" r:id="rId1"/>
   </p:sldMasterIdLst>
   <p:notesMasterIdLst>
-    <p:notesMasterId r:id="rId26"/>
+    <p:notesMasterId r:id="rId27"/>
   </p:notesMasterIdLst>
   <p:sldIdLst>
     <p:sldId id="256" r:id="rId2"/>
@@ -31,7 +31,8 @@
     <p:sldId id="276" r:id="rId22"/>
     <p:sldId id="277" r:id="rId23"/>
     <p:sldId id="265" r:id="rId24"/>
-    <p:sldId id="279" r:id="rId25"/>
+    <p:sldId id="282" r:id="rId25"/>
+    <p:sldId id="279" r:id="rId26"/>
   </p:sldIdLst>
   <p:sldSz cx="9144000" cy="6858000" type="screen4x3"/>
   <p:notesSz cx="6858000" cy="9144000"/>
@@ -169,6 +170,7 @@
             <p14:sldId id="276"/>
             <p14:sldId id="277"/>
             <p14:sldId id="265"/>
+            <p14:sldId id="282"/>
             <p14:sldId id="279"/>
           </p14:sldIdLst>
         </p14:section>
@@ -10712,15 +10714,16 @@
               <a:rPr lang="en-US" dirty="0"/>
               <a:t> </a:t>
             </a:r>
-            <a:endParaRPr lang="en-US" dirty="0" smtClean="0"/>
-          </a:p>
-          <a:p>
-            <a:pPr marL="0" indent="0">
-              <a:buNone/>
-            </a:pPr>
+            <a:endParaRPr lang="en-US" dirty="0"/>
+          </a:p>
+          <a:p>
             <a:r>
               <a:rPr lang="en-US" dirty="0" smtClean="0"/>
-              <a:t>Most of the common actions are wrapped by the bin/mahout script</a:t>
+              <a:t>Most </a:t>
+            </a:r>
+            <a:r>
+              <a:rPr lang="en-US" dirty="0" smtClean="0"/>
+              <a:t>of the common actions are wrapped by the bin/mahout script</a:t>
             </a:r>
             <a:endParaRPr lang="en-US" dirty="0"/>
           </a:p>
@@ -10736,6 +10739,13 @@
   <p:clrMapOvr>
     <a:masterClrMapping/>
   </p:clrMapOvr>
+  <p:timing>
+    <p:tnLst>
+      <p:par>
+        <p:cTn xmlns:p14="http://schemas.microsoft.com/office/powerpoint/2010/main" id="1" dur="indefinite" restart="never" nodeType="tmRoot"/>
+      </p:par>
+    </p:tnLst>
+  </p:timing>
 </p:sld>
 </file>
 
@@ -10824,17 +10834,17 @@
           </a:p>
           <a:p>
             <a:r>
-              <a:rPr lang="en-US" dirty="0" smtClean="0"/>
+              <a:rPr lang="en-US" sz="2200" dirty="0" smtClean="0"/>
               <a:t>Ex – Drop in replacement for </a:t>
             </a:r>
             <a:r>
-              <a:rPr lang="en-US" dirty="0" err="1" smtClean="0">
+              <a:rPr lang="en-US" sz="2200" dirty="0" err="1" smtClean="0">
                 <a:latin typeface="Consolas"/>
                 <a:cs typeface="Consolas"/>
               </a:rPr>
               <a:t>DistanceMeasure</a:t>
             </a:r>
-            <a:endParaRPr lang="en-US" dirty="0" smtClean="0">
+            <a:endParaRPr lang="en-US" sz="2200" dirty="0" smtClean="0">
               <a:latin typeface="Consolas"/>
               <a:cs typeface="Consolas"/>
             </a:endParaRPr>
@@ -11145,7 +11155,7 @@
           <a:p>
             <a:r>
               <a:rPr lang="en-US" dirty="0" smtClean="0"/>
-              <a:t>Demo</a:t>
+              <a:t>Demo A</a:t>
             </a:r>
             <a:endParaRPr lang="en-US" dirty="0"/>
           </a:p>
@@ -11163,12 +11173,18 @@
         </p:nvSpPr>
         <p:spPr/>
         <p:txBody>
-          <a:bodyPr/>
+          <a:bodyPr>
+            <a:normAutofit/>
+          </a:bodyPr>
           <a:lstStyle/>
           <a:p>
             <a:r>
               <a:rPr lang="en-US" dirty="0" smtClean="0"/>
-              <a:t>Recommendations on </a:t>
+              <a:t>Intro to Recommendations </a:t>
+            </a:r>
+            <a:r>
+              <a:rPr lang="en-US" dirty="0" smtClean="0"/>
+              <a:t>on </a:t>
             </a:r>
             <a:r>
               <a:rPr lang="en-US" dirty="0" err="1" smtClean="0"/>
@@ -11176,7 +11192,11 @@
             </a:r>
             <a:r>
               <a:rPr lang="en-US" dirty="0" smtClean="0"/>
-              <a:t> Data</a:t>
+              <a:t> </a:t>
+            </a:r>
+            <a:r>
+              <a:rPr lang="en-US" dirty="0" smtClean="0"/>
+              <a:t>Data</a:t>
             </a:r>
           </a:p>
           <a:p>
@@ -11191,6 +11211,12 @@
               <a:rPr lang="en-US" sz="1600" dirty="0" err="1" smtClean="0"/>
               <a:t>etc</a:t>
             </a:r>
+            <a:endParaRPr lang="en-US" sz="1600" dirty="0" smtClean="0"/>
+          </a:p>
+          <a:p>
+            <a:endParaRPr lang="en-US" sz="1600" dirty="0"/>
+          </a:p>
+          <a:p>
             <a:endParaRPr lang="en-US" sz="1600" dirty="0"/>
           </a:p>
         </p:txBody>
@@ -11216,6 +11242,99 @@
 </file>
 
 <file path=ppt/slides/slide24.xml><?xml version="1.0" encoding="utf-8"?>
+<p:sld xmlns:a="http://schemas.openxmlformats.org/drawingml/2006/main" xmlns:r="http://schemas.openxmlformats.org/officeDocument/2006/relationships" xmlns:p="http://schemas.openxmlformats.org/presentationml/2006/main">
+  <p:cSld>
+    <p:spTree>
+      <p:nvGrpSpPr>
+        <p:cNvPr id="1" name=""/>
+        <p:cNvGrpSpPr/>
+        <p:nvPr/>
+      </p:nvGrpSpPr>
+      <p:grpSpPr>
+        <a:xfrm>
+          <a:off x="0" y="0"/>
+          <a:ext cx="0" cy="0"/>
+          <a:chOff x="0" y="0"/>
+          <a:chExt cx="0" cy="0"/>
+        </a:xfrm>
+      </p:grpSpPr>
+      <p:sp>
+        <p:nvSpPr>
+          <p:cNvPr id="2" name="Title 1"/>
+          <p:cNvSpPr>
+            <a:spLocks noGrp="1"/>
+          </p:cNvSpPr>
+          <p:nvPr>
+            <p:ph type="title"/>
+          </p:nvPr>
+        </p:nvSpPr>
+        <p:spPr/>
+        <p:txBody>
+          <a:bodyPr/>
+          <a:lstStyle/>
+          <a:p>
+            <a:r>
+              <a:rPr lang="en-US" dirty="0" smtClean="0"/>
+              <a:t>Demo B</a:t>
+            </a:r>
+            <a:endParaRPr lang="en-US" dirty="0"/>
+          </a:p>
+        </p:txBody>
+      </p:sp>
+      <p:sp>
+        <p:nvSpPr>
+          <p:cNvPr id="3" name="Text Placeholder 2"/>
+          <p:cNvSpPr>
+            <a:spLocks noGrp="1"/>
+          </p:cNvSpPr>
+          <p:nvPr>
+            <p:ph type="body" idx="1"/>
+          </p:nvPr>
+        </p:nvSpPr>
+        <p:spPr/>
+        <p:txBody>
+          <a:bodyPr/>
+          <a:lstStyle/>
+          <a:p>
+            <a:r>
+              <a:rPr lang="en-US" dirty="0" err="1"/>
+              <a:t>BooleanPreference</a:t>
+            </a:r>
+            <a:r>
+              <a:rPr lang="en-US" dirty="0"/>
+              <a:t> Twitter User Recommender</a:t>
+            </a:r>
+          </a:p>
+          <a:p>
+            <a:endParaRPr lang="en-US" dirty="0" smtClean="0"/>
+          </a:p>
+          <a:p>
+            <a:r>
+              <a:rPr lang="en-US" sz="1600" dirty="0" smtClean="0"/>
+              <a:t>Going from idea to </a:t>
+            </a:r>
+            <a:r>
+              <a:rPr lang="en-US" sz="1600" dirty="0" err="1" smtClean="0"/>
+              <a:t>impl</a:t>
+            </a:r>
+            <a:endParaRPr lang="en-US" sz="1600" dirty="0"/>
+          </a:p>
+        </p:txBody>
+      </p:sp>
+    </p:spTree>
+    <p:extLst>
+      <p:ext uri="{BB962C8B-B14F-4D97-AF65-F5344CB8AC3E}">
+        <p14:creationId xmlns:p14="http://schemas.microsoft.com/office/powerpoint/2010/main" val="3600507472"/>
+      </p:ext>
+    </p:extLst>
+  </p:cSld>
+  <p:clrMapOvr>
+    <a:masterClrMapping/>
+  </p:clrMapOvr>
+</p:sld>
+</file>
+
+<file path=ppt/slides/slide25.xml><?xml version="1.0" encoding="utf-8"?>
 <p:sld xmlns:a="http://schemas.openxmlformats.org/drawingml/2006/main" xmlns:r="http://schemas.openxmlformats.org/officeDocument/2006/relationships" xmlns:p="http://schemas.openxmlformats.org/presentationml/2006/main">
   <p:cSld>
     <p:spTree>

</xml_diff>